<commit_message>
added short "refresher" page
</commit_message>
<xml_diff>
--- a/documents/presentations/First_Lab_Concepts.pptx
+++ b/documents/presentations/First_Lab_Concepts.pptx
@@ -9,7 +9,7 @@
     <p:sldId id="257" r:id="rId3"/>
     <p:sldId id="258" r:id="rId4"/>
     <p:sldId id="259" r:id="rId5"/>
-    <p:sldId id="260" r:id="rId6"/>
+    <p:sldId id="265" r:id="rId6"/>
     <p:sldId id="261" r:id="rId7"/>
     <p:sldId id="262" r:id="rId8"/>
     <p:sldId id="263" r:id="rId9"/>
@@ -4976,7 +4976,12 @@
             <p:ph type="title"/>
           </p:nvPr>
         </p:nvSpPr>
-        <p:spPr/>
+        <p:spPr>
+          <a:xfrm>
+            <a:off x="762000" y="368154"/>
+            <a:ext cx="10668000" cy="771525"/>
+          </a:xfrm>
+        </p:spPr>
         <p:txBody>
           <a:bodyPr/>
           <a:lstStyle/>
@@ -4991,10 +4996,10 @@
       </p:sp>
       <p:sp>
         <p:nvSpPr>
-          <p:cNvPr id="3" name="Inhaltsplatzhalter 2">
-            <a:extLst>
-              <a:ext uri="{FF2B5EF4-FFF2-40B4-BE49-F238E27FC236}">
-                <a16:creationId xmlns:a16="http://schemas.microsoft.com/office/drawing/2014/main" id="{8CB9AE3A-FE4C-F535-0C9A-1908CA52E34D}"/>
+          <p:cNvPr id="7" name="Inhaltsplatzhalter 6">
+            <a:extLst>
+              <a:ext uri="{FF2B5EF4-FFF2-40B4-BE49-F238E27FC236}">
+                <a16:creationId xmlns:a16="http://schemas.microsoft.com/office/drawing/2014/main" id="{3C85B47E-D825-D0F9-9997-A81F9979B4C7}"/>
               </a:ext>
             </a:extLst>
           </p:cNvPr>
@@ -5005,19 +5010,64 @@
             <p:ph idx="1"/>
           </p:nvPr>
         </p:nvSpPr>
-        <p:spPr/>
-        <p:txBody>
-          <a:bodyPr/>
-          <a:lstStyle/>
-          <a:p>
-            <a:endParaRPr lang="de-CH" dirty="0"/>
+        <p:spPr>
+          <a:xfrm>
+            <a:off x="762000" y="1333500"/>
+            <a:ext cx="10668000" cy="4943475"/>
+          </a:xfrm>
+        </p:spPr>
+        <p:txBody>
+          <a:bodyPr>
+            <a:normAutofit/>
+          </a:bodyPr>
+          <a:lstStyle/>
+          <a:p>
+            <a:r>
+              <a:rPr lang="en-US" dirty="0"/>
+              <a:t>Students get: </a:t>
+            </a:r>
+          </a:p>
+          <a:p>
+            <a:pPr lvl="1"/>
+            <a:r>
+              <a:rPr lang="en-US" dirty="0"/>
+              <a:t>Information about different subjects regarding ASM </a:t>
+            </a:r>
+          </a:p>
+          <a:p>
+            <a:pPr lvl="1"/>
+            <a:r>
+              <a:rPr lang="en-US" dirty="0"/>
+              <a:t>Exercises for the different subjects</a:t>
+            </a:r>
+          </a:p>
+          <a:p>
+            <a:r>
+              <a:rPr lang="en-US" dirty="0"/>
+              <a:t>Students hand in:</a:t>
+            </a:r>
+          </a:p>
+          <a:p>
+            <a:pPr lvl="1"/>
+            <a:r>
+              <a:rPr lang="en-US" dirty="0"/>
+              <a:t>Multiple Choice Answer Sheet or Write Up</a:t>
+            </a:r>
+          </a:p>
+          <a:p>
+            <a:pPr lvl="1"/>
+            <a:endParaRPr lang="en-US" dirty="0"/>
+          </a:p>
+          <a:p>
+            <a:pPr lvl="1"/>
+            <a:endParaRPr lang="en-US" dirty="0"/>
           </a:p>
         </p:txBody>
       </p:sp>
     </p:spTree>
     <p:extLst>
       <p:ext uri="{BB962C8B-B14F-4D97-AF65-F5344CB8AC3E}">
-        <p14:creationId xmlns:p14="http://schemas.microsoft.com/office/powerpoint/2010/main" val="41786438"/>
+        <p14:creationId xmlns:p14="http://schemas.microsoft.com/office/powerpoint/2010/main" val="809807648"/>
       </p:ext>
     </p:extLst>
   </p:cSld>

</xml_diff>